<commit_message>
Add x-correlator (fixes #298)
</commit_message>
<xml_diff>
--- a/spec/pictures/Pages.pptx
+++ b/spec/pictures/Pages.pptx
@@ -6,6 +6,7 @@
   </p:sldMasterIdLst>
   <p:sldIdLst>
     <p:sldId id="263" r:id="rId2"/>
+    <p:sldId id="264" r:id="rId3"/>
   </p:sldIdLst>
   <p:sldSz cx="12192000" cy="6858000"/>
   <p:notesSz cx="6858000" cy="9144000"/>
@@ -115,13 +116,245 @@
 <file path=ppt/revisionInfo.xml><?xml version="1.0" encoding="utf-8"?>
 <p1510:revInfo xmlns:a="http://schemas.openxmlformats.org/drawingml/2006/main" xmlns:r="http://schemas.openxmlformats.org/officeDocument/2006/relationships" xmlns:p1510="http://schemas.microsoft.com/office/powerpoint/2015/10/main">
   <p1510:revLst>
-    <p1510:client id="{7E4FCCEB-D42F-4DD9-867B-35F67576A4ED}" v="12" dt="2023-12-08T09:44:14.572"/>
+    <p1510:client id="{D54885B6-B0AF-458C-BA68-1BA13C3D521A}" v="3" dt="2024-01-26T17:32:50.328"/>
   </p1510:revLst>
 </p1510:revInfo>
 </file>
 
 <file path=ppt/changesInfos/changesInfo1.xml><?xml version="1.0" encoding="utf-8"?>
 <pc:chgInfo xmlns:a="http://schemas.openxmlformats.org/drawingml/2006/main" xmlns:r="http://schemas.openxmlformats.org/officeDocument/2006/relationships" xmlns:ac="http://schemas.microsoft.com/office/drawing/2013/main/command" xmlns:pc="http://schemas.microsoft.com/office/powerpoint/2013/main/command">
+  <pc:docChgLst>
+    <pc:chgData name="Thorsten Heinze" userId="8373ecd2-b5b9-4b48-849d-3bee853f6cc0" providerId="ADAL" clId="{D54885B6-B0AF-458C-BA68-1BA13C3D521A}"/>
+    <pc:docChg chg="addSld modSld">
+      <pc:chgData name="Thorsten Heinze" userId="8373ecd2-b5b9-4b48-849d-3bee853f6cc0" providerId="ADAL" clId="{D54885B6-B0AF-458C-BA68-1BA13C3D521A}" dt="2024-01-26T17:34:11.173" v="105" actId="1076"/>
+      <pc:docMkLst>
+        <pc:docMk/>
+      </pc:docMkLst>
+      <pc:sldChg chg="addSp modSp add mod">
+        <pc:chgData name="Thorsten Heinze" userId="8373ecd2-b5b9-4b48-849d-3bee853f6cc0" providerId="ADAL" clId="{D54885B6-B0AF-458C-BA68-1BA13C3D521A}" dt="2024-01-26T17:34:11.173" v="105" actId="1076"/>
+        <pc:sldMkLst>
+          <pc:docMk/>
+          <pc:sldMk cId="406222127" sldId="264"/>
+        </pc:sldMkLst>
+        <pc:spChg chg="mod">
+          <ac:chgData name="Thorsten Heinze" userId="8373ecd2-b5b9-4b48-849d-3bee853f6cc0" providerId="ADAL" clId="{D54885B6-B0AF-458C-BA68-1BA13C3D521A}" dt="2024-01-26T17:34:11.173" v="105" actId="1076"/>
+          <ac:spMkLst>
+            <pc:docMk/>
+            <pc:sldMk cId="406222127" sldId="264"/>
+            <ac:spMk id="2" creationId="{BAB9265A-2A10-1100-63C6-16F8BE20457B}"/>
+          </ac:spMkLst>
+        </pc:spChg>
+        <pc:spChg chg="mod">
+          <ac:chgData name="Thorsten Heinze" userId="8373ecd2-b5b9-4b48-849d-3bee853f6cc0" providerId="ADAL" clId="{D54885B6-B0AF-458C-BA68-1BA13C3D521A}" dt="2024-01-26T17:34:11.173" v="105" actId="1076"/>
+          <ac:spMkLst>
+            <pc:docMk/>
+            <pc:sldMk cId="406222127" sldId="264"/>
+            <ac:spMk id="3" creationId="{FE2918B3-6970-B0F4-5D60-73189BA11478}"/>
+          </ac:spMkLst>
+        </pc:spChg>
+        <pc:spChg chg="mod">
+          <ac:chgData name="Thorsten Heinze" userId="8373ecd2-b5b9-4b48-849d-3bee853f6cc0" providerId="ADAL" clId="{D54885B6-B0AF-458C-BA68-1BA13C3D521A}" dt="2024-01-26T17:34:11.173" v="105" actId="1076"/>
+          <ac:spMkLst>
+            <pc:docMk/>
+            <pc:sldMk cId="406222127" sldId="264"/>
+            <ac:spMk id="4" creationId="{5FE9BEE8-54DA-2231-D123-397D030A4BD3}"/>
+          </ac:spMkLst>
+        </pc:spChg>
+        <pc:spChg chg="add mod">
+          <ac:chgData name="Thorsten Heinze" userId="8373ecd2-b5b9-4b48-849d-3bee853f6cc0" providerId="ADAL" clId="{D54885B6-B0AF-458C-BA68-1BA13C3D521A}" dt="2024-01-26T17:34:11.173" v="105" actId="1076"/>
+          <ac:spMkLst>
+            <pc:docMk/>
+            <pc:sldMk cId="406222127" sldId="264"/>
+            <ac:spMk id="6" creationId="{DB937BBC-55A9-5573-E46E-37B3098B4B06}"/>
+          </ac:spMkLst>
+        </pc:spChg>
+        <pc:spChg chg="mod">
+          <ac:chgData name="Thorsten Heinze" userId="8373ecd2-b5b9-4b48-849d-3bee853f6cc0" providerId="ADAL" clId="{D54885B6-B0AF-458C-BA68-1BA13C3D521A}" dt="2024-01-26T17:34:11.173" v="105" actId="1076"/>
+          <ac:spMkLst>
+            <pc:docMk/>
+            <pc:sldMk cId="406222127" sldId="264"/>
+            <ac:spMk id="7" creationId="{FF9C34C9-85D6-90E2-61F9-CABB2045239E}"/>
+          </ac:spMkLst>
+        </pc:spChg>
+        <pc:spChg chg="add mod">
+          <ac:chgData name="Thorsten Heinze" userId="8373ecd2-b5b9-4b48-849d-3bee853f6cc0" providerId="ADAL" clId="{D54885B6-B0AF-458C-BA68-1BA13C3D521A}" dt="2024-01-26T17:34:11.173" v="105" actId="1076"/>
+          <ac:spMkLst>
+            <pc:docMk/>
+            <pc:sldMk cId="406222127" sldId="264"/>
+            <ac:spMk id="8" creationId="{D04BE4F9-4718-0700-B732-E8C45B04049B}"/>
+          </ac:spMkLst>
+        </pc:spChg>
+        <pc:spChg chg="mod">
+          <ac:chgData name="Thorsten Heinze" userId="8373ecd2-b5b9-4b48-849d-3bee853f6cc0" providerId="ADAL" clId="{D54885B6-B0AF-458C-BA68-1BA13C3D521A}" dt="2024-01-26T17:34:11.173" v="105" actId="1076"/>
+          <ac:spMkLst>
+            <pc:docMk/>
+            <pc:sldMk cId="406222127" sldId="264"/>
+            <ac:spMk id="9" creationId="{3819FB14-8F2C-C801-C066-116138DE30AB}"/>
+          </ac:spMkLst>
+        </pc:spChg>
+        <pc:spChg chg="mod">
+          <ac:chgData name="Thorsten Heinze" userId="8373ecd2-b5b9-4b48-849d-3bee853f6cc0" providerId="ADAL" clId="{D54885B6-B0AF-458C-BA68-1BA13C3D521A}" dt="2024-01-26T17:34:11.173" v="105" actId="1076"/>
+          <ac:spMkLst>
+            <pc:docMk/>
+            <pc:sldMk cId="406222127" sldId="264"/>
+            <ac:spMk id="10" creationId="{59590030-8C48-1C23-FF31-6BF2FE0FBFBE}"/>
+          </ac:spMkLst>
+        </pc:spChg>
+        <pc:spChg chg="add mod">
+          <ac:chgData name="Thorsten Heinze" userId="8373ecd2-b5b9-4b48-849d-3bee853f6cc0" providerId="ADAL" clId="{D54885B6-B0AF-458C-BA68-1BA13C3D521A}" dt="2024-01-26T17:34:11.173" v="105" actId="1076"/>
+          <ac:spMkLst>
+            <pc:docMk/>
+            <pc:sldMk cId="406222127" sldId="264"/>
+            <ac:spMk id="11" creationId="{9E9F56AD-9671-BCC3-4B66-E99FDF6B9B8B}"/>
+          </ac:spMkLst>
+        </pc:spChg>
+        <pc:spChg chg="mod">
+          <ac:chgData name="Thorsten Heinze" userId="8373ecd2-b5b9-4b48-849d-3bee853f6cc0" providerId="ADAL" clId="{D54885B6-B0AF-458C-BA68-1BA13C3D521A}" dt="2024-01-26T17:34:11.173" v="105" actId="1076"/>
+          <ac:spMkLst>
+            <pc:docMk/>
+            <pc:sldMk cId="406222127" sldId="264"/>
+            <ac:spMk id="12" creationId="{9BB5919D-653F-8435-C76E-9715D4F97D26}"/>
+          </ac:spMkLst>
+        </pc:spChg>
+        <pc:spChg chg="add mod">
+          <ac:chgData name="Thorsten Heinze" userId="8373ecd2-b5b9-4b48-849d-3bee853f6cc0" providerId="ADAL" clId="{D54885B6-B0AF-458C-BA68-1BA13C3D521A}" dt="2024-01-26T17:34:11.173" v="105" actId="1076"/>
+          <ac:spMkLst>
+            <pc:docMk/>
+            <pc:sldMk cId="406222127" sldId="264"/>
+            <ac:spMk id="13" creationId="{141FE6C7-9B0A-69CB-06FB-8BA56023F306}"/>
+          </ac:spMkLst>
+        </pc:spChg>
+        <pc:spChg chg="add mod">
+          <ac:chgData name="Thorsten Heinze" userId="8373ecd2-b5b9-4b48-849d-3bee853f6cc0" providerId="ADAL" clId="{D54885B6-B0AF-458C-BA68-1BA13C3D521A}" dt="2024-01-26T17:34:11.173" v="105" actId="1076"/>
+          <ac:spMkLst>
+            <pc:docMk/>
+            <pc:sldMk cId="406222127" sldId="264"/>
+            <ac:spMk id="14" creationId="{1EF20270-D2FC-1B75-D10E-7A14CA894F4E}"/>
+          </ac:spMkLst>
+        </pc:spChg>
+        <pc:spChg chg="add mod">
+          <ac:chgData name="Thorsten Heinze" userId="8373ecd2-b5b9-4b48-849d-3bee853f6cc0" providerId="ADAL" clId="{D54885B6-B0AF-458C-BA68-1BA13C3D521A}" dt="2024-01-26T17:34:11.173" v="105" actId="1076"/>
+          <ac:spMkLst>
+            <pc:docMk/>
+            <pc:sldMk cId="406222127" sldId="264"/>
+            <ac:spMk id="16" creationId="{71C40B38-2C96-882A-5132-3F5EEB171B76}"/>
+          </ac:spMkLst>
+        </pc:spChg>
+        <pc:spChg chg="mod">
+          <ac:chgData name="Thorsten Heinze" userId="8373ecd2-b5b9-4b48-849d-3bee853f6cc0" providerId="ADAL" clId="{D54885B6-B0AF-458C-BA68-1BA13C3D521A}" dt="2024-01-26T17:34:11.173" v="105" actId="1076"/>
+          <ac:spMkLst>
+            <pc:docMk/>
+            <pc:sldMk cId="406222127" sldId="264"/>
+            <ac:spMk id="23" creationId="{2ADF84E1-8085-FB3D-AF09-387C2BC0A363}"/>
+          </ac:spMkLst>
+        </pc:spChg>
+        <pc:spChg chg="mod">
+          <ac:chgData name="Thorsten Heinze" userId="8373ecd2-b5b9-4b48-849d-3bee853f6cc0" providerId="ADAL" clId="{D54885B6-B0AF-458C-BA68-1BA13C3D521A}" dt="2024-01-26T17:34:11.173" v="105" actId="1076"/>
+          <ac:spMkLst>
+            <pc:docMk/>
+            <pc:sldMk cId="406222127" sldId="264"/>
+            <ac:spMk id="25" creationId="{666541B0-F694-8FA6-3DBD-D9E19C07B722}"/>
+          </ac:spMkLst>
+        </pc:spChg>
+        <pc:spChg chg="mod">
+          <ac:chgData name="Thorsten Heinze" userId="8373ecd2-b5b9-4b48-849d-3bee853f6cc0" providerId="ADAL" clId="{D54885B6-B0AF-458C-BA68-1BA13C3D521A}" dt="2024-01-26T17:34:11.173" v="105" actId="1076"/>
+          <ac:spMkLst>
+            <pc:docMk/>
+            <pc:sldMk cId="406222127" sldId="264"/>
+            <ac:spMk id="26" creationId="{A2130B2B-8DC2-59FB-E410-80ED4DE49D06}"/>
+          </ac:spMkLst>
+        </pc:spChg>
+        <pc:spChg chg="mod">
+          <ac:chgData name="Thorsten Heinze" userId="8373ecd2-b5b9-4b48-849d-3bee853f6cc0" providerId="ADAL" clId="{D54885B6-B0AF-458C-BA68-1BA13C3D521A}" dt="2024-01-26T17:34:11.173" v="105" actId="1076"/>
+          <ac:spMkLst>
+            <pc:docMk/>
+            <pc:sldMk cId="406222127" sldId="264"/>
+            <ac:spMk id="27" creationId="{A9A441BD-F8EE-F19C-6A65-D4F5A714C37D}"/>
+          </ac:spMkLst>
+        </pc:spChg>
+        <pc:spChg chg="mod">
+          <ac:chgData name="Thorsten Heinze" userId="8373ecd2-b5b9-4b48-849d-3bee853f6cc0" providerId="ADAL" clId="{D54885B6-B0AF-458C-BA68-1BA13C3D521A}" dt="2024-01-26T17:34:11.173" v="105" actId="1076"/>
+          <ac:spMkLst>
+            <pc:docMk/>
+            <pc:sldMk cId="406222127" sldId="264"/>
+            <ac:spMk id="29" creationId="{3712D227-B3CF-18B6-7B7A-3DA91EE98DC0}"/>
+          </ac:spMkLst>
+        </pc:spChg>
+        <pc:spChg chg="mod">
+          <ac:chgData name="Thorsten Heinze" userId="8373ecd2-b5b9-4b48-849d-3bee853f6cc0" providerId="ADAL" clId="{D54885B6-B0AF-458C-BA68-1BA13C3D521A}" dt="2024-01-26T17:34:11.173" v="105" actId="1076"/>
+          <ac:spMkLst>
+            <pc:docMk/>
+            <pc:sldMk cId="406222127" sldId="264"/>
+            <ac:spMk id="30" creationId="{7E082088-A8B2-CA04-2276-AEBDE4132DB3}"/>
+          </ac:spMkLst>
+        </pc:spChg>
+        <pc:cxnChg chg="add mod">
+          <ac:chgData name="Thorsten Heinze" userId="8373ecd2-b5b9-4b48-849d-3bee853f6cc0" providerId="ADAL" clId="{D54885B6-B0AF-458C-BA68-1BA13C3D521A}" dt="2024-01-26T17:34:11.173" v="105" actId="1076"/>
+          <ac:cxnSpMkLst>
+            <pc:docMk/>
+            <pc:sldMk cId="406222127" sldId="264"/>
+            <ac:cxnSpMk id="5" creationId="{C6DFF34D-17F2-40E9-451A-883BB2334A6A}"/>
+          </ac:cxnSpMkLst>
+        </pc:cxnChg>
+        <pc:cxnChg chg="mod">
+          <ac:chgData name="Thorsten Heinze" userId="8373ecd2-b5b9-4b48-849d-3bee853f6cc0" providerId="ADAL" clId="{D54885B6-B0AF-458C-BA68-1BA13C3D521A}" dt="2024-01-26T17:34:11.173" v="105" actId="1076"/>
+          <ac:cxnSpMkLst>
+            <pc:docMk/>
+            <pc:sldMk cId="406222127" sldId="264"/>
+            <ac:cxnSpMk id="15" creationId="{82AE1D31-95F2-3AC7-463A-60E2993F9ED7}"/>
+          </ac:cxnSpMkLst>
+        </pc:cxnChg>
+        <pc:cxnChg chg="add mod">
+          <ac:chgData name="Thorsten Heinze" userId="8373ecd2-b5b9-4b48-849d-3bee853f6cc0" providerId="ADAL" clId="{D54885B6-B0AF-458C-BA68-1BA13C3D521A}" dt="2024-01-26T17:34:11.173" v="105" actId="1076"/>
+          <ac:cxnSpMkLst>
+            <pc:docMk/>
+            <pc:sldMk cId="406222127" sldId="264"/>
+            <ac:cxnSpMk id="17" creationId="{43433B68-7B0C-B4E2-99E1-1CCAB669D5DB}"/>
+          </ac:cxnSpMkLst>
+        </pc:cxnChg>
+        <pc:cxnChg chg="mod">
+          <ac:chgData name="Thorsten Heinze" userId="8373ecd2-b5b9-4b48-849d-3bee853f6cc0" providerId="ADAL" clId="{D54885B6-B0AF-458C-BA68-1BA13C3D521A}" dt="2024-01-26T17:34:11.173" v="105" actId="1076"/>
+          <ac:cxnSpMkLst>
+            <pc:docMk/>
+            <pc:sldMk cId="406222127" sldId="264"/>
+            <ac:cxnSpMk id="18" creationId="{AC79CBDB-C77C-FB50-65AB-3FD8FAF00BBC}"/>
+          </ac:cxnSpMkLst>
+        </pc:cxnChg>
+        <pc:cxnChg chg="mod">
+          <ac:chgData name="Thorsten Heinze" userId="8373ecd2-b5b9-4b48-849d-3bee853f6cc0" providerId="ADAL" clId="{D54885B6-B0AF-458C-BA68-1BA13C3D521A}" dt="2024-01-26T17:34:11.173" v="105" actId="1076"/>
+          <ac:cxnSpMkLst>
+            <pc:docMk/>
+            <pc:sldMk cId="406222127" sldId="264"/>
+            <ac:cxnSpMk id="19" creationId="{84C230F6-46B7-2D23-780C-08B3D2314688}"/>
+          </ac:cxnSpMkLst>
+        </pc:cxnChg>
+        <pc:cxnChg chg="mod">
+          <ac:chgData name="Thorsten Heinze" userId="8373ecd2-b5b9-4b48-849d-3bee853f6cc0" providerId="ADAL" clId="{D54885B6-B0AF-458C-BA68-1BA13C3D521A}" dt="2024-01-26T17:34:11.173" v="105" actId="1076"/>
+          <ac:cxnSpMkLst>
+            <pc:docMk/>
+            <pc:sldMk cId="406222127" sldId="264"/>
+            <ac:cxnSpMk id="20" creationId="{B672D8E6-DDF2-59E5-CE4D-80A8E1D923C7}"/>
+          </ac:cxnSpMkLst>
+        </pc:cxnChg>
+        <pc:cxnChg chg="mod">
+          <ac:chgData name="Thorsten Heinze" userId="8373ecd2-b5b9-4b48-849d-3bee853f6cc0" providerId="ADAL" clId="{D54885B6-B0AF-458C-BA68-1BA13C3D521A}" dt="2024-01-26T17:34:11.173" v="105" actId="1076"/>
+          <ac:cxnSpMkLst>
+            <pc:docMk/>
+            <pc:sldMk cId="406222127" sldId="264"/>
+            <ac:cxnSpMk id="21" creationId="{862263C5-0C7E-642D-1C8B-4000456598FE}"/>
+          </ac:cxnSpMkLst>
+        </pc:cxnChg>
+        <pc:cxnChg chg="mod">
+          <ac:chgData name="Thorsten Heinze" userId="8373ecd2-b5b9-4b48-849d-3bee853f6cc0" providerId="ADAL" clId="{D54885B6-B0AF-458C-BA68-1BA13C3D521A}" dt="2024-01-26T17:34:11.173" v="105" actId="1076"/>
+          <ac:cxnSpMkLst>
+            <pc:docMk/>
+            <pc:sldMk cId="406222127" sldId="264"/>
+            <ac:cxnSpMk id="32" creationId="{FC6A3EBD-6B12-9282-4136-A8D6D4A94555}"/>
+          </ac:cxnSpMkLst>
+        </pc:cxnChg>
+      </pc:sldChg>
+    </pc:docChg>
+  </pc:docChgLst>
   <pc:docChgLst>
     <pc:chgData name="Thorsten Heinze" userId="8373ecd2-b5b9-4b48-849d-3bee853f6cc0" providerId="ADAL" clId="{7E4FCCEB-D42F-4DD9-867B-35F67576A4ED}"/>
     <pc:docChg chg="undo custSel addSld delSld modSld">
@@ -916,7 +1149,7 @@
           <a:p>
             <a:fld id="{48B9BBD4-0F2B-4EE5-BDD5-C9DF58FE3246}" type="datetimeFigureOut">
               <a:rPr lang="de-DE" smtClean="0"/>
-              <a:t>08.12.2023</a:t>
+              <a:t>26.01.2024</a:t>
             </a:fld>
             <a:endParaRPr lang="de-DE"/>
           </a:p>
@@ -1114,7 +1347,7 @@
           <a:p>
             <a:fld id="{48B9BBD4-0F2B-4EE5-BDD5-C9DF58FE3246}" type="datetimeFigureOut">
               <a:rPr lang="de-DE" smtClean="0"/>
-              <a:t>08.12.2023</a:t>
+              <a:t>26.01.2024</a:t>
             </a:fld>
             <a:endParaRPr lang="de-DE"/>
           </a:p>
@@ -1322,7 +1555,7 @@
           <a:p>
             <a:fld id="{48B9BBD4-0F2B-4EE5-BDD5-C9DF58FE3246}" type="datetimeFigureOut">
               <a:rPr lang="de-DE" smtClean="0"/>
-              <a:t>08.12.2023</a:t>
+              <a:t>26.01.2024</a:t>
             </a:fld>
             <a:endParaRPr lang="de-DE"/>
           </a:p>
@@ -1520,7 +1753,7 @@
           <a:p>
             <a:fld id="{48B9BBD4-0F2B-4EE5-BDD5-C9DF58FE3246}" type="datetimeFigureOut">
               <a:rPr lang="de-DE" smtClean="0"/>
-              <a:t>08.12.2023</a:t>
+              <a:t>26.01.2024</a:t>
             </a:fld>
             <a:endParaRPr lang="de-DE"/>
           </a:p>
@@ -1795,7 +2028,7 @@
           <a:p>
             <a:fld id="{48B9BBD4-0F2B-4EE5-BDD5-C9DF58FE3246}" type="datetimeFigureOut">
               <a:rPr lang="de-DE" smtClean="0"/>
-              <a:t>08.12.2023</a:t>
+              <a:t>26.01.2024</a:t>
             </a:fld>
             <a:endParaRPr lang="de-DE"/>
           </a:p>
@@ -2060,7 +2293,7 @@
           <a:p>
             <a:fld id="{48B9BBD4-0F2B-4EE5-BDD5-C9DF58FE3246}" type="datetimeFigureOut">
               <a:rPr lang="de-DE" smtClean="0"/>
-              <a:t>08.12.2023</a:t>
+              <a:t>26.01.2024</a:t>
             </a:fld>
             <a:endParaRPr lang="de-DE"/>
           </a:p>
@@ -2472,7 +2705,7 @@
           <a:p>
             <a:fld id="{48B9BBD4-0F2B-4EE5-BDD5-C9DF58FE3246}" type="datetimeFigureOut">
               <a:rPr lang="de-DE" smtClean="0"/>
-              <a:t>08.12.2023</a:t>
+              <a:t>26.01.2024</a:t>
             </a:fld>
             <a:endParaRPr lang="de-DE"/>
           </a:p>
@@ -2613,7 +2846,7 @@
           <a:p>
             <a:fld id="{48B9BBD4-0F2B-4EE5-BDD5-C9DF58FE3246}" type="datetimeFigureOut">
               <a:rPr lang="de-DE" smtClean="0"/>
-              <a:t>08.12.2023</a:t>
+              <a:t>26.01.2024</a:t>
             </a:fld>
             <a:endParaRPr lang="de-DE"/>
           </a:p>
@@ -2726,7 +2959,7 @@
           <a:p>
             <a:fld id="{48B9BBD4-0F2B-4EE5-BDD5-C9DF58FE3246}" type="datetimeFigureOut">
               <a:rPr lang="de-DE" smtClean="0"/>
-              <a:t>08.12.2023</a:t>
+              <a:t>26.01.2024</a:t>
             </a:fld>
             <a:endParaRPr lang="de-DE"/>
           </a:p>
@@ -3037,7 +3270,7 @@
           <a:p>
             <a:fld id="{48B9BBD4-0F2B-4EE5-BDD5-C9DF58FE3246}" type="datetimeFigureOut">
               <a:rPr lang="de-DE" smtClean="0"/>
-              <a:t>08.12.2023</a:t>
+              <a:t>26.01.2024</a:t>
             </a:fld>
             <a:endParaRPr lang="de-DE"/>
           </a:p>
@@ -3325,7 +3558,7 @@
           <a:p>
             <a:fld id="{48B9BBD4-0F2B-4EE5-BDD5-C9DF58FE3246}" type="datetimeFigureOut">
               <a:rPr lang="de-DE" smtClean="0"/>
-              <a:t>08.12.2023</a:t>
+              <a:t>26.01.2024</a:t>
             </a:fld>
             <a:endParaRPr lang="de-DE"/>
           </a:p>
@@ -3566,7 +3799,7 @@
           <a:p>
             <a:fld id="{48B9BBD4-0F2B-4EE5-BDD5-C9DF58FE3246}" type="datetimeFigureOut">
               <a:rPr lang="de-DE" smtClean="0"/>
-              <a:t>08.12.2023</a:t>
+              <a:t>26.01.2024</a:t>
             </a:fld>
             <a:endParaRPr lang="de-DE"/>
           </a:p>
@@ -5043,6 +5276,1574 @@
 </p:sld>
 </file>
 
+<file path=ppt/slides/slide2.xml><?xml version="1.0" encoding="utf-8"?>
+<p:sld xmlns:a="http://schemas.openxmlformats.org/drawingml/2006/main" xmlns:r="http://schemas.openxmlformats.org/officeDocument/2006/relationships" xmlns:p="http://schemas.openxmlformats.org/presentationml/2006/main">
+  <p:cSld>
+    <p:spTree>
+      <p:nvGrpSpPr>
+        <p:cNvPr id="1" name=""/>
+        <p:cNvGrpSpPr/>
+        <p:nvPr/>
+      </p:nvGrpSpPr>
+      <p:grpSpPr>
+        <a:xfrm>
+          <a:off x="0" y="0"/>
+          <a:ext cx="0" cy="0"/>
+          <a:chOff x="0" y="0"/>
+          <a:chExt cx="0" cy="0"/>
+        </a:xfrm>
+      </p:grpSpPr>
+      <p:sp>
+        <p:nvSpPr>
+          <p:cNvPr id="10" name="Rechteck 9">
+            <a:extLst>
+              <a:ext uri="{FF2B5EF4-FFF2-40B4-BE49-F238E27FC236}">
+                <a16:creationId xmlns:a16="http://schemas.microsoft.com/office/drawing/2014/main" id="{59590030-8C48-1C23-FF31-6BF2FE0FBFBE}"/>
+              </a:ext>
+            </a:extLst>
+          </p:cNvPr>
+          <p:cNvSpPr/>
+          <p:nvPr/>
+        </p:nvSpPr>
+        <p:spPr>
+          <a:xfrm>
+            <a:off x="1319497" y="95540"/>
+            <a:ext cx="8886330" cy="6666919"/>
+          </a:xfrm>
+          <a:prstGeom prst="rect">
+            <a:avLst/>
+          </a:prstGeom>
+        </p:spPr>
+        <p:style>
+          <a:lnRef idx="2">
+            <a:schemeClr val="accent4">
+              <a:shade val="50000"/>
+            </a:schemeClr>
+          </a:lnRef>
+          <a:fillRef idx="1">
+            <a:schemeClr val="accent4"/>
+          </a:fillRef>
+          <a:effectRef idx="0">
+            <a:schemeClr val="accent4"/>
+          </a:effectRef>
+          <a:fontRef idx="minor">
+            <a:schemeClr val="lt1"/>
+          </a:fontRef>
+        </p:style>
+        <p:txBody>
+          <a:bodyPr rtlCol="0" anchor="ctr"/>
+          <a:lstStyle/>
+          <a:p>
+            <a:pPr algn="ctr"/>
+            <a:endParaRPr lang="en-US" dirty="0"/>
+          </a:p>
+        </p:txBody>
+      </p:sp>
+      <p:sp>
+        <p:nvSpPr>
+          <p:cNvPr id="7" name="Rechteck: abgerundete Ecken 6">
+            <a:extLst>
+              <a:ext uri="{FF2B5EF4-FFF2-40B4-BE49-F238E27FC236}">
+                <a16:creationId xmlns:a16="http://schemas.microsoft.com/office/drawing/2014/main" id="{FF9C34C9-85D6-90E2-61F9-CABB2045239E}"/>
+              </a:ext>
+            </a:extLst>
+          </p:cNvPr>
+          <p:cNvSpPr/>
+          <p:nvPr/>
+        </p:nvSpPr>
+        <p:spPr>
+          <a:xfrm>
+            <a:off x="1824405" y="1305777"/>
+            <a:ext cx="3610502" cy="332715"/>
+          </a:xfrm>
+          <a:prstGeom prst="roundRect">
+            <a:avLst/>
+          </a:prstGeom>
+          <a:ln>
+            <a:noFill/>
+          </a:ln>
+          <a:effectLst>
+            <a:outerShdw blurRad="50800" dist="38100" dir="2700000" algn="tl" rotWithShape="0">
+              <a:prstClr val="black">
+                <a:alpha val="40000"/>
+              </a:prstClr>
+            </a:outerShdw>
+          </a:effectLst>
+          <a:scene3d>
+            <a:camera prst="orthographicFront">
+              <a:rot lat="0" lon="0" rev="0"/>
+            </a:camera>
+            <a:lightRig rig="glow" dir="t">
+              <a:rot lat="0" lon="0" rev="4800000"/>
+            </a:lightRig>
+          </a:scene3d>
+          <a:sp3d prstMaterial="matte">
+            <a:bevelT w="127000" h="63500"/>
+          </a:sp3d>
+        </p:spPr>
+        <p:style>
+          <a:lnRef idx="0">
+            <a:schemeClr val="accent1"/>
+          </a:lnRef>
+          <a:fillRef idx="3">
+            <a:schemeClr val="accent1"/>
+          </a:fillRef>
+          <a:effectRef idx="3">
+            <a:schemeClr val="accent1"/>
+          </a:effectRef>
+          <a:fontRef idx="minor">
+            <a:schemeClr val="lt1"/>
+          </a:fontRef>
+        </p:style>
+        <p:txBody>
+          <a:bodyPr rtlCol="0" anchor="ctr"/>
+          <a:lstStyle/>
+          <a:p>
+            <a:pPr algn="ctr"/>
+            <a:r>
+              <a:rPr lang="en-US" dirty="0"/>
+              <a:t>Update List</a:t>
+            </a:r>
+          </a:p>
+        </p:txBody>
+      </p:sp>
+      <p:sp>
+        <p:nvSpPr>
+          <p:cNvPr id="3" name="Textfeld 2">
+            <a:extLst>
+              <a:ext uri="{FF2B5EF4-FFF2-40B4-BE49-F238E27FC236}">
+                <a16:creationId xmlns:a16="http://schemas.microsoft.com/office/drawing/2014/main" id="{FE2918B3-6970-B0F4-5D60-73189BA11478}"/>
+              </a:ext>
+            </a:extLst>
+          </p:cNvPr>
+          <p:cNvSpPr txBox="1"/>
+          <p:nvPr/>
+        </p:nvSpPr>
+        <p:spPr>
+          <a:xfrm>
+            <a:off x="1756558" y="771511"/>
+            <a:ext cx="1133515" cy="369332"/>
+          </a:xfrm>
+          <a:prstGeom prst="rect">
+            <a:avLst/>
+          </a:prstGeom>
+          <a:noFill/>
+        </p:spPr>
+        <p:txBody>
+          <a:bodyPr wrap="none" rtlCol="0">
+            <a:spAutoFit/>
+          </a:bodyPr>
+          <a:lstStyle/>
+          <a:p>
+            <a:r>
+              <a:rPr lang="en-US" dirty="0"/>
+              <a:t>Password:</a:t>
+            </a:r>
+          </a:p>
+        </p:txBody>
+      </p:sp>
+      <p:sp>
+        <p:nvSpPr>
+          <p:cNvPr id="4" name="Rechteck 3">
+            <a:extLst>
+              <a:ext uri="{FF2B5EF4-FFF2-40B4-BE49-F238E27FC236}">
+                <a16:creationId xmlns:a16="http://schemas.microsoft.com/office/drawing/2014/main" id="{5FE9BEE8-54DA-2231-D123-397D030A4BD3}"/>
+              </a:ext>
+            </a:extLst>
+          </p:cNvPr>
+          <p:cNvSpPr/>
+          <p:nvPr/>
+        </p:nvSpPr>
+        <p:spPr>
+          <a:xfrm>
+            <a:off x="2964103" y="771511"/>
+            <a:ext cx="2348254" cy="332715"/>
+          </a:xfrm>
+          <a:prstGeom prst="rect">
+            <a:avLst/>
+          </a:prstGeom>
+        </p:spPr>
+        <p:style>
+          <a:lnRef idx="2">
+            <a:schemeClr val="accent1"/>
+          </a:lnRef>
+          <a:fillRef idx="1">
+            <a:schemeClr val="lt1"/>
+          </a:fillRef>
+          <a:effectRef idx="0">
+            <a:schemeClr val="accent1"/>
+          </a:effectRef>
+          <a:fontRef idx="minor">
+            <a:schemeClr val="dk1"/>
+          </a:fontRef>
+        </p:style>
+        <p:txBody>
+          <a:bodyPr rtlCol="0" anchor="ctr"/>
+          <a:lstStyle/>
+          <a:p>
+            <a:pPr algn="ctr"/>
+            <a:endParaRPr lang="en-US"/>
+          </a:p>
+        </p:txBody>
+      </p:sp>
+      <p:sp>
+        <p:nvSpPr>
+          <p:cNvPr id="9" name="Textfeld 8">
+            <a:extLst>
+              <a:ext uri="{FF2B5EF4-FFF2-40B4-BE49-F238E27FC236}">
+                <a16:creationId xmlns:a16="http://schemas.microsoft.com/office/drawing/2014/main" id="{3819FB14-8F2C-C801-C066-116138DE30AB}"/>
+              </a:ext>
+            </a:extLst>
+          </p:cNvPr>
+          <p:cNvSpPr txBox="1"/>
+          <p:nvPr/>
+        </p:nvSpPr>
+        <p:spPr>
+          <a:xfrm>
+            <a:off x="1756558" y="383304"/>
+            <a:ext cx="1212191" cy="369332"/>
+          </a:xfrm>
+          <a:prstGeom prst="rect">
+            <a:avLst/>
+          </a:prstGeom>
+          <a:noFill/>
+        </p:spPr>
+        <p:txBody>
+          <a:bodyPr wrap="none" rtlCol="0">
+            <a:spAutoFit/>
+          </a:bodyPr>
+          <a:lstStyle/>
+          <a:p>
+            <a:r>
+              <a:rPr lang="en-US" dirty="0"/>
+              <a:t>Username:</a:t>
+            </a:r>
+          </a:p>
+        </p:txBody>
+      </p:sp>
+      <p:sp>
+        <p:nvSpPr>
+          <p:cNvPr id="12" name="Rechteck 11">
+            <a:extLst>
+              <a:ext uri="{FF2B5EF4-FFF2-40B4-BE49-F238E27FC236}">
+                <a16:creationId xmlns:a16="http://schemas.microsoft.com/office/drawing/2014/main" id="{9BB5919D-653F-8435-C76E-9715D4F97D26}"/>
+              </a:ext>
+            </a:extLst>
+          </p:cNvPr>
+          <p:cNvSpPr/>
+          <p:nvPr/>
+        </p:nvSpPr>
+        <p:spPr>
+          <a:xfrm>
+            <a:off x="2964103" y="383304"/>
+            <a:ext cx="2348254" cy="332715"/>
+          </a:xfrm>
+          <a:prstGeom prst="rect">
+            <a:avLst/>
+          </a:prstGeom>
+        </p:spPr>
+        <p:style>
+          <a:lnRef idx="2">
+            <a:schemeClr val="accent1"/>
+          </a:lnRef>
+          <a:fillRef idx="1">
+            <a:schemeClr val="lt1"/>
+          </a:fillRef>
+          <a:effectRef idx="0">
+            <a:schemeClr val="accent1"/>
+          </a:effectRef>
+          <a:fontRef idx="minor">
+            <a:schemeClr val="dk1"/>
+          </a:fontRef>
+        </p:style>
+        <p:txBody>
+          <a:bodyPr rtlCol="0" anchor="ctr"/>
+          <a:lstStyle/>
+          <a:p>
+            <a:pPr algn="ctr"/>
+            <a:endParaRPr lang="en-US"/>
+          </a:p>
+        </p:txBody>
+      </p:sp>
+      <p:sp>
+        <p:nvSpPr>
+          <p:cNvPr id="2" name="Rechteck 1">
+            <a:extLst>
+              <a:ext uri="{FF2B5EF4-FFF2-40B4-BE49-F238E27FC236}">
+                <a16:creationId xmlns:a16="http://schemas.microsoft.com/office/drawing/2014/main" id="{BAB9265A-2A10-1100-63C6-16F8BE20457B}"/>
+              </a:ext>
+            </a:extLst>
+          </p:cNvPr>
+          <p:cNvSpPr/>
+          <p:nvPr/>
+        </p:nvSpPr>
+        <p:spPr>
+          <a:xfrm>
+            <a:off x="1824406" y="1805595"/>
+            <a:ext cx="7805786" cy="2348333"/>
+          </a:xfrm>
+          <a:prstGeom prst="rect">
+            <a:avLst/>
+          </a:prstGeom>
+          <a:solidFill>
+            <a:schemeClr val="bg1"/>
+          </a:solidFill>
+          <a:ln>
+            <a:solidFill>
+              <a:schemeClr val="bg1"/>
+            </a:solidFill>
+          </a:ln>
+        </p:spPr>
+        <p:style>
+          <a:lnRef idx="2">
+            <a:schemeClr val="accent1">
+              <a:shade val="50000"/>
+            </a:schemeClr>
+          </a:lnRef>
+          <a:fillRef idx="1">
+            <a:schemeClr val="accent1"/>
+          </a:fillRef>
+          <a:effectRef idx="0">
+            <a:schemeClr val="accent1"/>
+          </a:effectRef>
+          <a:fontRef idx="minor">
+            <a:schemeClr val="lt1"/>
+          </a:fontRef>
+        </p:style>
+        <p:txBody>
+          <a:bodyPr rtlCol="0" anchor="t"/>
+          <a:lstStyle/>
+          <a:p>
+            <a:r>
+              <a:rPr lang="de-DE" sz="1400" dirty="0" err="1">
+                <a:solidFill>
+                  <a:schemeClr val="tx1"/>
+                </a:solidFill>
+              </a:rPr>
+              <a:t>ApplicationName</a:t>
+            </a:r>
+            <a:r>
+              <a:rPr lang="de-DE" sz="1400" dirty="0">
+                <a:solidFill>
+                  <a:schemeClr val="tx1"/>
+                </a:solidFill>
+              </a:rPr>
+              <a:t>   </a:t>
+            </a:r>
+            <a:r>
+              <a:rPr lang="de-DE" sz="1400" dirty="0" err="1">
+                <a:solidFill>
+                  <a:schemeClr val="tx1"/>
+                </a:solidFill>
+              </a:rPr>
+              <a:t>ReleaseNumber</a:t>
+            </a:r>
+            <a:r>
+              <a:rPr lang="de-DE" sz="1400" dirty="0">
+                <a:solidFill>
+                  <a:schemeClr val="tx1"/>
+                </a:solidFill>
+              </a:rPr>
+              <a:t>   </a:t>
+            </a:r>
+            <a:r>
+              <a:rPr lang="de-DE" sz="1400" dirty="0" err="1">
+                <a:solidFill>
+                  <a:schemeClr val="tx1"/>
+                </a:solidFill>
+              </a:rPr>
+              <a:t>ApprovalStatus</a:t>
+            </a:r>
+            <a:r>
+              <a:rPr lang="de-DE" sz="1400" dirty="0">
+                <a:solidFill>
+                  <a:schemeClr val="tx1"/>
+                </a:solidFill>
+              </a:rPr>
+              <a:t>   </a:t>
+            </a:r>
+            <a:r>
+              <a:rPr lang="de-DE" sz="1400" err="1">
+                <a:solidFill>
+                  <a:schemeClr val="tx1"/>
+                </a:solidFill>
+              </a:rPr>
+              <a:t>EmbeddingStatus</a:t>
+            </a:r>
+            <a:r>
+              <a:rPr lang="de-DE" sz="1400">
+                <a:solidFill>
+                  <a:schemeClr val="tx1"/>
+                </a:solidFill>
+              </a:rPr>
+              <a:t>   ReasonOfFailure   xCorrelator</a:t>
+            </a:r>
+            <a:endParaRPr lang="de-DE" sz="1400" dirty="0">
+              <a:solidFill>
+                <a:schemeClr val="tx1"/>
+              </a:solidFill>
+            </a:endParaRPr>
+          </a:p>
+        </p:txBody>
+      </p:sp>
+      <p:cxnSp>
+        <p:nvCxnSpPr>
+          <p:cNvPr id="15" name="Gerader Verbinder 14">
+            <a:extLst>
+              <a:ext uri="{FF2B5EF4-FFF2-40B4-BE49-F238E27FC236}">
+                <a16:creationId xmlns:a16="http://schemas.microsoft.com/office/drawing/2014/main" id="{82AE1D31-95F2-3AC7-463A-60E2993F9ED7}"/>
+              </a:ext>
+            </a:extLst>
+          </p:cNvPr>
+          <p:cNvCxnSpPr>
+            <a:cxnSpLocks/>
+          </p:cNvCxnSpPr>
+          <p:nvPr/>
+        </p:nvCxnSpPr>
+        <p:spPr>
+          <a:xfrm>
+            <a:off x="3229192" y="1900417"/>
+            <a:ext cx="0" cy="2190459"/>
+          </a:xfrm>
+          <a:prstGeom prst="line">
+            <a:avLst/>
+          </a:prstGeom>
+          <a:ln w="19050"/>
+        </p:spPr>
+        <p:style>
+          <a:lnRef idx="1">
+            <a:schemeClr val="dk1"/>
+          </a:lnRef>
+          <a:fillRef idx="0">
+            <a:schemeClr val="dk1"/>
+          </a:fillRef>
+          <a:effectRef idx="0">
+            <a:schemeClr val="dk1"/>
+          </a:effectRef>
+          <a:fontRef idx="minor">
+            <a:schemeClr val="tx1"/>
+          </a:fontRef>
+        </p:style>
+      </p:cxnSp>
+      <p:cxnSp>
+        <p:nvCxnSpPr>
+          <p:cNvPr id="18" name="Gerader Verbinder 17">
+            <a:extLst>
+              <a:ext uri="{FF2B5EF4-FFF2-40B4-BE49-F238E27FC236}">
+                <a16:creationId xmlns:a16="http://schemas.microsoft.com/office/drawing/2014/main" id="{AC79CBDB-C77C-FB50-65AB-3FD8FAF00BBC}"/>
+              </a:ext>
+            </a:extLst>
+          </p:cNvPr>
+          <p:cNvCxnSpPr>
+            <a:cxnSpLocks/>
+          </p:cNvCxnSpPr>
+          <p:nvPr/>
+        </p:nvCxnSpPr>
+        <p:spPr>
+          <a:xfrm>
+            <a:off x="4506216" y="1892238"/>
+            <a:ext cx="0" cy="2190459"/>
+          </a:xfrm>
+          <a:prstGeom prst="line">
+            <a:avLst/>
+          </a:prstGeom>
+          <a:ln w="19050"/>
+        </p:spPr>
+        <p:style>
+          <a:lnRef idx="1">
+            <a:schemeClr val="dk1"/>
+          </a:lnRef>
+          <a:fillRef idx="0">
+            <a:schemeClr val="dk1"/>
+          </a:fillRef>
+          <a:effectRef idx="0">
+            <a:schemeClr val="dk1"/>
+          </a:effectRef>
+          <a:fontRef idx="minor">
+            <a:schemeClr val="tx1"/>
+          </a:fontRef>
+        </p:style>
+      </p:cxnSp>
+      <p:cxnSp>
+        <p:nvCxnSpPr>
+          <p:cNvPr id="19" name="Gerader Verbinder 18">
+            <a:extLst>
+              <a:ext uri="{FF2B5EF4-FFF2-40B4-BE49-F238E27FC236}">
+                <a16:creationId xmlns:a16="http://schemas.microsoft.com/office/drawing/2014/main" id="{84C230F6-46B7-2D23-780C-08B3D2314688}"/>
+              </a:ext>
+            </a:extLst>
+          </p:cNvPr>
+          <p:cNvCxnSpPr>
+            <a:cxnSpLocks/>
+          </p:cNvCxnSpPr>
+          <p:nvPr/>
+        </p:nvCxnSpPr>
+        <p:spPr>
+          <a:xfrm>
+            <a:off x="5721686" y="1892238"/>
+            <a:ext cx="0" cy="2190459"/>
+          </a:xfrm>
+          <a:prstGeom prst="line">
+            <a:avLst/>
+          </a:prstGeom>
+          <a:ln w="19050"/>
+        </p:spPr>
+        <p:style>
+          <a:lnRef idx="1">
+            <a:schemeClr val="dk1"/>
+          </a:lnRef>
+          <a:fillRef idx="0">
+            <a:schemeClr val="dk1"/>
+          </a:fillRef>
+          <a:effectRef idx="0">
+            <a:schemeClr val="dk1"/>
+          </a:effectRef>
+          <a:fontRef idx="minor">
+            <a:schemeClr val="tx1"/>
+          </a:fontRef>
+        </p:style>
+      </p:cxnSp>
+      <p:cxnSp>
+        <p:nvCxnSpPr>
+          <p:cNvPr id="20" name="Gerader Verbinder 19">
+            <a:extLst>
+              <a:ext uri="{FF2B5EF4-FFF2-40B4-BE49-F238E27FC236}">
+                <a16:creationId xmlns:a16="http://schemas.microsoft.com/office/drawing/2014/main" id="{B672D8E6-DDF2-59E5-CE4D-80A8E1D923C7}"/>
+              </a:ext>
+            </a:extLst>
+          </p:cNvPr>
+          <p:cNvCxnSpPr>
+            <a:cxnSpLocks/>
+          </p:cNvCxnSpPr>
+          <p:nvPr/>
+        </p:nvCxnSpPr>
+        <p:spPr>
+          <a:xfrm>
+            <a:off x="7111627" y="1892238"/>
+            <a:ext cx="0" cy="2190459"/>
+          </a:xfrm>
+          <a:prstGeom prst="line">
+            <a:avLst/>
+          </a:prstGeom>
+          <a:ln w="19050"/>
+        </p:spPr>
+        <p:style>
+          <a:lnRef idx="1">
+            <a:schemeClr val="dk1"/>
+          </a:lnRef>
+          <a:fillRef idx="0">
+            <a:schemeClr val="dk1"/>
+          </a:fillRef>
+          <a:effectRef idx="0">
+            <a:schemeClr val="dk1"/>
+          </a:effectRef>
+          <a:fontRef idx="minor">
+            <a:schemeClr val="tx1"/>
+          </a:fontRef>
+        </p:style>
+      </p:cxnSp>
+      <p:cxnSp>
+        <p:nvCxnSpPr>
+          <p:cNvPr id="21" name="Gerader Verbinder 20">
+            <a:extLst>
+              <a:ext uri="{FF2B5EF4-FFF2-40B4-BE49-F238E27FC236}">
+                <a16:creationId xmlns:a16="http://schemas.microsoft.com/office/drawing/2014/main" id="{862263C5-0C7E-642D-1C8B-4000456598FE}"/>
+              </a:ext>
+            </a:extLst>
+          </p:cNvPr>
+          <p:cNvCxnSpPr>
+            <a:cxnSpLocks/>
+          </p:cNvCxnSpPr>
+          <p:nvPr/>
+        </p:nvCxnSpPr>
+        <p:spPr>
+          <a:xfrm flipH="1">
+            <a:off x="1882145" y="2158955"/>
+            <a:ext cx="7704791" cy="0"/>
+          </a:xfrm>
+          <a:prstGeom prst="line">
+            <a:avLst/>
+          </a:prstGeom>
+          <a:ln w="19050"/>
+        </p:spPr>
+        <p:style>
+          <a:lnRef idx="1">
+            <a:schemeClr val="dk1"/>
+          </a:lnRef>
+          <a:fillRef idx="0">
+            <a:schemeClr val="dk1"/>
+          </a:fillRef>
+          <a:effectRef idx="0">
+            <a:schemeClr val="dk1"/>
+          </a:effectRef>
+          <a:fontRef idx="minor">
+            <a:schemeClr val="tx1"/>
+          </a:fontRef>
+        </p:style>
+      </p:cxnSp>
+      <p:sp>
+        <p:nvSpPr>
+          <p:cNvPr id="23" name="Textfeld 22">
+            <a:extLst>
+              <a:ext uri="{FF2B5EF4-FFF2-40B4-BE49-F238E27FC236}">
+                <a16:creationId xmlns:a16="http://schemas.microsoft.com/office/drawing/2014/main" id="{2ADF84E1-8085-FB3D-AF09-387C2BC0A363}"/>
+              </a:ext>
+            </a:extLst>
+          </p:cNvPr>
+          <p:cNvSpPr txBox="1"/>
+          <p:nvPr/>
+        </p:nvSpPr>
+        <p:spPr>
+          <a:xfrm>
+            <a:off x="1756558" y="4241009"/>
+            <a:ext cx="5207045" cy="338554"/>
+          </a:xfrm>
+          <a:prstGeom prst="rect">
+            <a:avLst/>
+          </a:prstGeom>
+          <a:solidFill>
+            <a:schemeClr val="accent4"/>
+          </a:solidFill>
+          <a:ln>
+            <a:noFill/>
+          </a:ln>
+        </p:spPr>
+        <p:style>
+          <a:lnRef idx="2">
+            <a:schemeClr val="accent1">
+              <a:shade val="50000"/>
+            </a:schemeClr>
+          </a:lnRef>
+          <a:fillRef idx="1">
+            <a:schemeClr val="accent1"/>
+          </a:fillRef>
+          <a:effectRef idx="0">
+            <a:schemeClr val="accent1"/>
+          </a:effectRef>
+          <a:fontRef idx="minor">
+            <a:schemeClr val="lt1"/>
+          </a:fontRef>
+        </p:style>
+        <p:txBody>
+          <a:bodyPr rtlCol="0" anchor="t"/>
+          <a:lstStyle>
+            <a:defPPr>
+              <a:defRPr lang="de-DE"/>
+            </a:defPPr>
+            <a:lvl1pPr algn="ctr">
+              <a:defRPr sz="1600"/>
+            </a:lvl1pPr>
+            <a:lvl2pPr>
+              <a:defRPr>
+                <a:solidFill>
+                  <a:schemeClr val="lt1"/>
+                </a:solidFill>
+              </a:defRPr>
+            </a:lvl2pPr>
+            <a:lvl3pPr>
+              <a:defRPr>
+                <a:solidFill>
+                  <a:schemeClr val="lt1"/>
+                </a:solidFill>
+              </a:defRPr>
+            </a:lvl3pPr>
+            <a:lvl4pPr>
+              <a:defRPr>
+                <a:solidFill>
+                  <a:schemeClr val="lt1"/>
+                </a:solidFill>
+              </a:defRPr>
+            </a:lvl4pPr>
+            <a:lvl5pPr>
+              <a:defRPr>
+                <a:solidFill>
+                  <a:schemeClr val="lt1"/>
+                </a:solidFill>
+              </a:defRPr>
+            </a:lvl5pPr>
+            <a:lvl6pPr>
+              <a:defRPr>
+                <a:solidFill>
+                  <a:schemeClr val="lt1"/>
+                </a:solidFill>
+              </a:defRPr>
+            </a:lvl6pPr>
+            <a:lvl7pPr>
+              <a:defRPr>
+                <a:solidFill>
+                  <a:schemeClr val="lt1"/>
+                </a:solidFill>
+              </a:defRPr>
+            </a:lvl7pPr>
+            <a:lvl8pPr>
+              <a:defRPr>
+                <a:solidFill>
+                  <a:schemeClr val="lt1"/>
+                </a:solidFill>
+              </a:defRPr>
+            </a:lvl8pPr>
+            <a:lvl9pPr>
+              <a:defRPr>
+                <a:solidFill>
+                  <a:schemeClr val="lt1"/>
+                </a:solidFill>
+              </a:defRPr>
+            </a:lvl9pPr>
+          </a:lstStyle>
+          <a:p>
+            <a:pPr algn="l"/>
+            <a:r>
+              <a:rPr lang="de-DE" dirty="0" err="1">
+                <a:solidFill>
+                  <a:schemeClr val="tx1"/>
+                </a:solidFill>
+              </a:rPr>
+              <a:t>ApplicationName</a:t>
+            </a:r>
+            <a:r>
+              <a:rPr lang="de-DE" dirty="0">
+                <a:solidFill>
+                  <a:schemeClr val="tx1"/>
+                </a:solidFill>
+              </a:rPr>
+              <a:t>:       </a:t>
+            </a:r>
+            <a:r>
+              <a:rPr lang="de-DE" dirty="0" err="1">
+                <a:solidFill>
+                  <a:schemeClr val="tx1"/>
+                </a:solidFill>
+              </a:rPr>
+              <a:t>ReleaseNumber</a:t>
+            </a:r>
+            <a:r>
+              <a:rPr lang="de-DE" dirty="0">
+                <a:solidFill>
+                  <a:schemeClr val="tx1"/>
+                </a:solidFill>
+              </a:rPr>
+              <a:t>:        </a:t>
+            </a:r>
+            <a:r>
+              <a:rPr lang="de-DE" dirty="0" err="1">
+                <a:solidFill>
+                  <a:schemeClr val="tx1"/>
+                </a:solidFill>
+              </a:rPr>
+              <a:t>ApprovalStatus</a:t>
+            </a:r>
+            <a:r>
+              <a:rPr lang="de-DE" dirty="0">
+                <a:solidFill>
+                  <a:schemeClr val="tx1"/>
+                </a:solidFill>
+              </a:rPr>
+              <a:t>:</a:t>
+            </a:r>
+          </a:p>
+        </p:txBody>
+      </p:sp>
+      <p:sp>
+        <p:nvSpPr>
+          <p:cNvPr id="25" name="Rechteck 24">
+            <a:extLst>
+              <a:ext uri="{FF2B5EF4-FFF2-40B4-BE49-F238E27FC236}">
+                <a16:creationId xmlns:a16="http://schemas.microsoft.com/office/drawing/2014/main" id="{666541B0-F694-8FA6-3DBD-D9E19C07B722}"/>
+              </a:ext>
+            </a:extLst>
+          </p:cNvPr>
+          <p:cNvSpPr/>
+          <p:nvPr/>
+        </p:nvSpPr>
+        <p:spPr>
+          <a:xfrm>
+            <a:off x="1814298" y="4548549"/>
+            <a:ext cx="1664089" cy="332715"/>
+          </a:xfrm>
+          <a:prstGeom prst="rect">
+            <a:avLst/>
+          </a:prstGeom>
+        </p:spPr>
+        <p:style>
+          <a:lnRef idx="2">
+            <a:schemeClr val="accent1"/>
+          </a:lnRef>
+          <a:fillRef idx="1">
+            <a:schemeClr val="lt1"/>
+          </a:fillRef>
+          <a:effectRef idx="0">
+            <a:schemeClr val="accent1"/>
+          </a:effectRef>
+          <a:fontRef idx="minor">
+            <a:schemeClr val="dk1"/>
+          </a:fontRef>
+        </p:style>
+        <p:txBody>
+          <a:bodyPr rtlCol="0" anchor="ctr"/>
+          <a:lstStyle/>
+          <a:p>
+            <a:pPr algn="ctr"/>
+            <a:endParaRPr lang="en-US"/>
+          </a:p>
+        </p:txBody>
+      </p:sp>
+      <p:sp>
+        <p:nvSpPr>
+          <p:cNvPr id="26" name="Rechteck 25">
+            <a:extLst>
+              <a:ext uri="{FF2B5EF4-FFF2-40B4-BE49-F238E27FC236}">
+                <a16:creationId xmlns:a16="http://schemas.microsoft.com/office/drawing/2014/main" id="{A2130B2B-8DC2-59FB-E410-80ED4DE49D06}"/>
+              </a:ext>
+            </a:extLst>
+          </p:cNvPr>
+          <p:cNvSpPr/>
+          <p:nvPr/>
+        </p:nvSpPr>
+        <p:spPr>
+          <a:xfrm>
+            <a:off x="3589047" y="4548548"/>
+            <a:ext cx="1664089" cy="332715"/>
+          </a:xfrm>
+          <a:prstGeom prst="rect">
+            <a:avLst/>
+          </a:prstGeom>
+        </p:spPr>
+        <p:style>
+          <a:lnRef idx="2">
+            <a:schemeClr val="accent1"/>
+          </a:lnRef>
+          <a:fillRef idx="1">
+            <a:schemeClr val="lt1"/>
+          </a:fillRef>
+          <a:effectRef idx="0">
+            <a:schemeClr val="accent1"/>
+          </a:effectRef>
+          <a:fontRef idx="minor">
+            <a:schemeClr val="dk1"/>
+          </a:fontRef>
+        </p:style>
+        <p:txBody>
+          <a:bodyPr rtlCol="0" anchor="ctr"/>
+          <a:lstStyle/>
+          <a:p>
+            <a:pPr algn="ctr"/>
+            <a:endParaRPr lang="en-US"/>
+          </a:p>
+        </p:txBody>
+      </p:sp>
+      <p:sp>
+        <p:nvSpPr>
+          <p:cNvPr id="27" name="Rechteck 26">
+            <a:extLst>
+              <a:ext uri="{FF2B5EF4-FFF2-40B4-BE49-F238E27FC236}">
+                <a16:creationId xmlns:a16="http://schemas.microsoft.com/office/drawing/2014/main" id="{A9A441BD-F8EE-F19C-6A65-D4F5A714C37D}"/>
+              </a:ext>
+            </a:extLst>
+          </p:cNvPr>
+          <p:cNvSpPr/>
+          <p:nvPr/>
+        </p:nvSpPr>
+        <p:spPr>
+          <a:xfrm>
+            <a:off x="5357254" y="4548548"/>
+            <a:ext cx="1664089" cy="332715"/>
+          </a:xfrm>
+          <a:prstGeom prst="rect">
+            <a:avLst/>
+          </a:prstGeom>
+        </p:spPr>
+        <p:style>
+          <a:lnRef idx="2">
+            <a:schemeClr val="accent1"/>
+          </a:lnRef>
+          <a:fillRef idx="1">
+            <a:schemeClr val="lt1"/>
+          </a:fillRef>
+          <a:effectRef idx="0">
+            <a:schemeClr val="accent1"/>
+          </a:effectRef>
+          <a:fontRef idx="minor">
+            <a:schemeClr val="dk1"/>
+          </a:fontRef>
+        </p:style>
+        <p:txBody>
+          <a:bodyPr rtlCol="0" anchor="ctr"/>
+          <a:lstStyle/>
+          <a:p>
+            <a:pPr algn="ctr"/>
+            <a:endParaRPr lang="en-US"/>
+          </a:p>
+        </p:txBody>
+      </p:sp>
+      <p:sp>
+        <p:nvSpPr>
+          <p:cNvPr id="29" name="Rechteck: abgerundete Ecken 28">
+            <a:extLst>
+              <a:ext uri="{FF2B5EF4-FFF2-40B4-BE49-F238E27FC236}">
+                <a16:creationId xmlns:a16="http://schemas.microsoft.com/office/drawing/2014/main" id="{3712D227-B3CF-18B6-7B7A-3DA91EE98DC0}"/>
+              </a:ext>
+            </a:extLst>
+          </p:cNvPr>
+          <p:cNvSpPr/>
+          <p:nvPr/>
+        </p:nvSpPr>
+        <p:spPr>
+          <a:xfrm>
+            <a:off x="1814298" y="4998075"/>
+            <a:ext cx="3610502" cy="332715"/>
+          </a:xfrm>
+          <a:prstGeom prst="roundRect">
+            <a:avLst/>
+          </a:prstGeom>
+          <a:ln>
+            <a:noFill/>
+          </a:ln>
+          <a:effectLst>
+            <a:outerShdw blurRad="50800" dist="38100" dir="2700000" algn="tl" rotWithShape="0">
+              <a:prstClr val="black">
+                <a:alpha val="40000"/>
+              </a:prstClr>
+            </a:outerShdw>
+          </a:effectLst>
+          <a:scene3d>
+            <a:camera prst="orthographicFront">
+              <a:rot lat="0" lon="0" rev="0"/>
+            </a:camera>
+            <a:lightRig rig="glow" dir="t">
+              <a:rot lat="0" lon="0" rev="4800000"/>
+            </a:lightRig>
+          </a:scene3d>
+          <a:sp3d prstMaterial="matte">
+            <a:bevelT w="127000" h="63500"/>
+          </a:sp3d>
+        </p:spPr>
+        <p:style>
+          <a:lnRef idx="0">
+            <a:schemeClr val="accent1"/>
+          </a:lnRef>
+          <a:fillRef idx="3">
+            <a:schemeClr val="accent1"/>
+          </a:fillRef>
+          <a:effectRef idx="3">
+            <a:schemeClr val="accent1"/>
+          </a:effectRef>
+          <a:fontRef idx="minor">
+            <a:schemeClr val="lt1"/>
+          </a:fontRef>
+        </p:style>
+        <p:txBody>
+          <a:bodyPr rtlCol="0" anchor="ctr"/>
+          <a:lstStyle/>
+          <a:p>
+            <a:pPr algn="ctr"/>
+            <a:r>
+              <a:rPr lang="en-US" dirty="0"/>
+              <a:t>Update Approval Status</a:t>
+            </a:r>
+          </a:p>
+        </p:txBody>
+      </p:sp>
+      <p:sp>
+        <p:nvSpPr>
+          <p:cNvPr id="30" name="Pfeil: nach unten 29">
+            <a:extLst>
+              <a:ext uri="{FF2B5EF4-FFF2-40B4-BE49-F238E27FC236}">
+                <a16:creationId xmlns:a16="http://schemas.microsoft.com/office/drawing/2014/main" id="{7E082088-A8B2-CA04-2276-AEBDE4132DB3}"/>
+              </a:ext>
+            </a:extLst>
+          </p:cNvPr>
+          <p:cNvSpPr/>
+          <p:nvPr/>
+        </p:nvSpPr>
+        <p:spPr>
+          <a:xfrm>
+            <a:off x="6855412" y="4640756"/>
+            <a:ext cx="92824" cy="179314"/>
+          </a:xfrm>
+          <a:prstGeom prst="downArrow">
+            <a:avLst/>
+          </a:prstGeom>
+          <a:solidFill>
+            <a:schemeClr val="bg2">
+              <a:lumMod val="50000"/>
+            </a:schemeClr>
+          </a:solidFill>
+        </p:spPr>
+        <p:style>
+          <a:lnRef idx="2">
+            <a:schemeClr val="dk1">
+              <a:shade val="50000"/>
+            </a:schemeClr>
+          </a:lnRef>
+          <a:fillRef idx="1">
+            <a:schemeClr val="dk1"/>
+          </a:fillRef>
+          <a:effectRef idx="0">
+            <a:schemeClr val="dk1"/>
+          </a:effectRef>
+          <a:fontRef idx="minor">
+            <a:schemeClr val="lt1"/>
+          </a:fontRef>
+        </p:style>
+        <p:txBody>
+          <a:bodyPr rtlCol="0" anchor="ctr"/>
+          <a:lstStyle/>
+          <a:p>
+            <a:pPr algn="ctr"/>
+            <a:endParaRPr lang="de-DE"/>
+          </a:p>
+        </p:txBody>
+      </p:sp>
+      <p:cxnSp>
+        <p:nvCxnSpPr>
+          <p:cNvPr id="32" name="Gerader Verbinder 31">
+            <a:extLst>
+              <a:ext uri="{FF2B5EF4-FFF2-40B4-BE49-F238E27FC236}">
+                <a16:creationId xmlns:a16="http://schemas.microsoft.com/office/drawing/2014/main" id="{FC6A3EBD-6B12-9282-4136-A8D6D4A94555}"/>
+              </a:ext>
+            </a:extLst>
+          </p:cNvPr>
+          <p:cNvCxnSpPr>
+            <a:cxnSpLocks/>
+          </p:cNvCxnSpPr>
+          <p:nvPr/>
+        </p:nvCxnSpPr>
+        <p:spPr>
+          <a:xfrm>
+            <a:off x="6782304" y="4548548"/>
+            <a:ext cx="0" cy="332715"/>
+          </a:xfrm>
+          <a:prstGeom prst="line">
+            <a:avLst/>
+          </a:prstGeom>
+        </p:spPr>
+        <p:style>
+          <a:lnRef idx="1">
+            <a:schemeClr val="dk1"/>
+          </a:lnRef>
+          <a:fillRef idx="0">
+            <a:schemeClr val="dk1"/>
+          </a:fillRef>
+          <a:effectRef idx="0">
+            <a:schemeClr val="dk1"/>
+          </a:effectRef>
+          <a:fontRef idx="minor">
+            <a:schemeClr val="tx1"/>
+          </a:fontRef>
+        </p:style>
+      </p:cxnSp>
+      <p:cxnSp>
+        <p:nvCxnSpPr>
+          <p:cNvPr id="5" name="Gerader Verbinder 4">
+            <a:extLst>
+              <a:ext uri="{FF2B5EF4-FFF2-40B4-BE49-F238E27FC236}">
+                <a16:creationId xmlns:a16="http://schemas.microsoft.com/office/drawing/2014/main" id="{C6DFF34D-17F2-40E9-451A-883BB2334A6A}"/>
+              </a:ext>
+            </a:extLst>
+          </p:cNvPr>
+          <p:cNvCxnSpPr>
+            <a:cxnSpLocks/>
+          </p:cNvCxnSpPr>
+          <p:nvPr/>
+        </p:nvCxnSpPr>
+        <p:spPr>
+          <a:xfrm>
+            <a:off x="8396729" y="1892238"/>
+            <a:ext cx="0" cy="2190459"/>
+          </a:xfrm>
+          <a:prstGeom prst="line">
+            <a:avLst/>
+          </a:prstGeom>
+          <a:ln w="19050"/>
+        </p:spPr>
+        <p:style>
+          <a:lnRef idx="1">
+            <a:schemeClr val="dk1"/>
+          </a:lnRef>
+          <a:fillRef idx="0">
+            <a:schemeClr val="dk1"/>
+          </a:fillRef>
+          <a:effectRef idx="0">
+            <a:schemeClr val="dk1"/>
+          </a:effectRef>
+          <a:fontRef idx="minor">
+            <a:schemeClr val="tx1"/>
+          </a:fontRef>
+        </p:style>
+      </p:cxnSp>
+      <p:sp>
+        <p:nvSpPr>
+          <p:cNvPr id="6" name="Textfeld 5">
+            <a:extLst>
+              <a:ext uri="{FF2B5EF4-FFF2-40B4-BE49-F238E27FC236}">
+                <a16:creationId xmlns:a16="http://schemas.microsoft.com/office/drawing/2014/main" id="{DB937BBC-55A9-5573-E46E-37B3098B4B06}"/>
+              </a:ext>
+            </a:extLst>
+          </p:cNvPr>
+          <p:cNvSpPr txBox="1"/>
+          <p:nvPr/>
+        </p:nvSpPr>
+        <p:spPr>
+          <a:xfrm>
+            <a:off x="1766665" y="5481597"/>
+            <a:ext cx="5207045" cy="338554"/>
+          </a:xfrm>
+          <a:prstGeom prst="rect">
+            <a:avLst/>
+          </a:prstGeom>
+          <a:solidFill>
+            <a:schemeClr val="accent4"/>
+          </a:solidFill>
+          <a:ln>
+            <a:noFill/>
+          </a:ln>
+        </p:spPr>
+        <p:style>
+          <a:lnRef idx="2">
+            <a:schemeClr val="accent1">
+              <a:shade val="50000"/>
+            </a:schemeClr>
+          </a:lnRef>
+          <a:fillRef idx="1">
+            <a:schemeClr val="accent1"/>
+          </a:fillRef>
+          <a:effectRef idx="0">
+            <a:schemeClr val="accent1"/>
+          </a:effectRef>
+          <a:fontRef idx="minor">
+            <a:schemeClr val="lt1"/>
+          </a:fontRef>
+        </p:style>
+        <p:txBody>
+          <a:bodyPr rtlCol="0" anchor="t"/>
+          <a:lstStyle>
+            <a:defPPr>
+              <a:defRPr lang="de-DE"/>
+            </a:defPPr>
+            <a:lvl1pPr algn="ctr">
+              <a:defRPr sz="1600"/>
+            </a:lvl1pPr>
+            <a:lvl2pPr>
+              <a:defRPr>
+                <a:solidFill>
+                  <a:schemeClr val="lt1"/>
+                </a:solidFill>
+              </a:defRPr>
+            </a:lvl2pPr>
+            <a:lvl3pPr>
+              <a:defRPr>
+                <a:solidFill>
+                  <a:schemeClr val="lt1"/>
+                </a:solidFill>
+              </a:defRPr>
+            </a:lvl3pPr>
+            <a:lvl4pPr>
+              <a:defRPr>
+                <a:solidFill>
+                  <a:schemeClr val="lt1"/>
+                </a:solidFill>
+              </a:defRPr>
+            </a:lvl4pPr>
+            <a:lvl5pPr>
+              <a:defRPr>
+                <a:solidFill>
+                  <a:schemeClr val="lt1"/>
+                </a:solidFill>
+              </a:defRPr>
+            </a:lvl5pPr>
+            <a:lvl6pPr>
+              <a:defRPr>
+                <a:solidFill>
+                  <a:schemeClr val="lt1"/>
+                </a:solidFill>
+              </a:defRPr>
+            </a:lvl6pPr>
+            <a:lvl7pPr>
+              <a:defRPr>
+                <a:solidFill>
+                  <a:schemeClr val="lt1"/>
+                </a:solidFill>
+              </a:defRPr>
+            </a:lvl7pPr>
+            <a:lvl8pPr>
+              <a:defRPr>
+                <a:solidFill>
+                  <a:schemeClr val="lt1"/>
+                </a:solidFill>
+              </a:defRPr>
+            </a:lvl8pPr>
+            <a:lvl9pPr>
+              <a:defRPr>
+                <a:solidFill>
+                  <a:schemeClr val="lt1"/>
+                </a:solidFill>
+              </a:defRPr>
+            </a:lvl9pPr>
+          </a:lstStyle>
+          <a:p>
+            <a:pPr algn="l"/>
+            <a:r>
+              <a:rPr lang="de-DE" dirty="0" err="1">
+                <a:solidFill>
+                  <a:schemeClr val="tx1"/>
+                </a:solidFill>
+              </a:rPr>
+              <a:t>ApplicationName</a:t>
+            </a:r>
+            <a:r>
+              <a:rPr lang="de-DE" dirty="0">
+                <a:solidFill>
+                  <a:schemeClr val="tx1"/>
+                </a:solidFill>
+              </a:rPr>
+              <a:t>:       </a:t>
+            </a:r>
+            <a:r>
+              <a:rPr lang="de-DE" dirty="0" err="1">
+                <a:solidFill>
+                  <a:schemeClr val="tx1"/>
+                </a:solidFill>
+              </a:rPr>
+              <a:t>ReleaseNumber</a:t>
+            </a:r>
+            <a:r>
+              <a:rPr lang="de-DE">
+                <a:solidFill>
+                  <a:schemeClr val="tx1"/>
+                </a:solidFill>
+              </a:rPr>
+              <a:t>:         </a:t>
+            </a:r>
+            <a:r>
+              <a:rPr lang="de-DE" sz="1600">
+                <a:solidFill>
+                  <a:schemeClr val="tx1"/>
+                </a:solidFill>
+              </a:rPr>
+              <a:t>EmbeddingStatus </a:t>
+            </a:r>
+            <a:r>
+              <a:rPr lang="de-DE">
+                <a:solidFill>
+                  <a:schemeClr val="tx1"/>
+                </a:solidFill>
+              </a:rPr>
+              <a:t>:</a:t>
+            </a:r>
+            <a:endParaRPr lang="de-DE" dirty="0">
+              <a:solidFill>
+                <a:schemeClr val="tx1"/>
+              </a:solidFill>
+            </a:endParaRPr>
+          </a:p>
+        </p:txBody>
+      </p:sp>
+      <p:sp>
+        <p:nvSpPr>
+          <p:cNvPr id="8" name="Rechteck 7">
+            <a:extLst>
+              <a:ext uri="{FF2B5EF4-FFF2-40B4-BE49-F238E27FC236}">
+                <a16:creationId xmlns:a16="http://schemas.microsoft.com/office/drawing/2014/main" id="{D04BE4F9-4718-0700-B732-E8C45B04049B}"/>
+              </a:ext>
+            </a:extLst>
+          </p:cNvPr>
+          <p:cNvSpPr/>
+          <p:nvPr/>
+        </p:nvSpPr>
+        <p:spPr>
+          <a:xfrm>
+            <a:off x="1824405" y="5789137"/>
+            <a:ext cx="1664089" cy="332715"/>
+          </a:xfrm>
+          <a:prstGeom prst="rect">
+            <a:avLst/>
+          </a:prstGeom>
+        </p:spPr>
+        <p:style>
+          <a:lnRef idx="2">
+            <a:schemeClr val="accent1"/>
+          </a:lnRef>
+          <a:fillRef idx="1">
+            <a:schemeClr val="lt1"/>
+          </a:fillRef>
+          <a:effectRef idx="0">
+            <a:schemeClr val="accent1"/>
+          </a:effectRef>
+          <a:fontRef idx="minor">
+            <a:schemeClr val="dk1"/>
+          </a:fontRef>
+        </p:style>
+        <p:txBody>
+          <a:bodyPr rtlCol="0" anchor="ctr"/>
+          <a:lstStyle/>
+          <a:p>
+            <a:pPr algn="ctr"/>
+            <a:endParaRPr lang="en-US"/>
+          </a:p>
+        </p:txBody>
+      </p:sp>
+      <p:sp>
+        <p:nvSpPr>
+          <p:cNvPr id="11" name="Rechteck 10">
+            <a:extLst>
+              <a:ext uri="{FF2B5EF4-FFF2-40B4-BE49-F238E27FC236}">
+                <a16:creationId xmlns:a16="http://schemas.microsoft.com/office/drawing/2014/main" id="{9E9F56AD-9671-BCC3-4B66-E99FDF6B9B8B}"/>
+              </a:ext>
+            </a:extLst>
+          </p:cNvPr>
+          <p:cNvSpPr/>
+          <p:nvPr/>
+        </p:nvSpPr>
+        <p:spPr>
+          <a:xfrm>
+            <a:off x="3599154" y="5789136"/>
+            <a:ext cx="1664089" cy="332715"/>
+          </a:xfrm>
+          <a:prstGeom prst="rect">
+            <a:avLst/>
+          </a:prstGeom>
+        </p:spPr>
+        <p:style>
+          <a:lnRef idx="2">
+            <a:schemeClr val="accent1"/>
+          </a:lnRef>
+          <a:fillRef idx="1">
+            <a:schemeClr val="lt1"/>
+          </a:fillRef>
+          <a:effectRef idx="0">
+            <a:schemeClr val="accent1"/>
+          </a:effectRef>
+          <a:fontRef idx="minor">
+            <a:schemeClr val="dk1"/>
+          </a:fontRef>
+        </p:style>
+        <p:txBody>
+          <a:bodyPr rtlCol="0" anchor="ctr"/>
+          <a:lstStyle/>
+          <a:p>
+            <a:pPr algn="ctr"/>
+            <a:endParaRPr lang="en-US"/>
+          </a:p>
+        </p:txBody>
+      </p:sp>
+      <p:sp>
+        <p:nvSpPr>
+          <p:cNvPr id="13" name="Rechteck 12">
+            <a:extLst>
+              <a:ext uri="{FF2B5EF4-FFF2-40B4-BE49-F238E27FC236}">
+                <a16:creationId xmlns:a16="http://schemas.microsoft.com/office/drawing/2014/main" id="{141FE6C7-9B0A-69CB-06FB-8BA56023F306}"/>
+              </a:ext>
+            </a:extLst>
+          </p:cNvPr>
+          <p:cNvSpPr/>
+          <p:nvPr/>
+        </p:nvSpPr>
+        <p:spPr>
+          <a:xfrm>
+            <a:off x="5367361" y="5789136"/>
+            <a:ext cx="1664089" cy="332715"/>
+          </a:xfrm>
+          <a:prstGeom prst="rect">
+            <a:avLst/>
+          </a:prstGeom>
+        </p:spPr>
+        <p:style>
+          <a:lnRef idx="2">
+            <a:schemeClr val="accent1"/>
+          </a:lnRef>
+          <a:fillRef idx="1">
+            <a:schemeClr val="lt1"/>
+          </a:fillRef>
+          <a:effectRef idx="0">
+            <a:schemeClr val="accent1"/>
+          </a:effectRef>
+          <a:fontRef idx="minor">
+            <a:schemeClr val="dk1"/>
+          </a:fontRef>
+        </p:style>
+        <p:txBody>
+          <a:bodyPr rtlCol="0" anchor="ctr"/>
+          <a:lstStyle/>
+          <a:p>
+            <a:pPr algn="ctr"/>
+            <a:endParaRPr lang="en-US"/>
+          </a:p>
+        </p:txBody>
+      </p:sp>
+      <p:sp>
+        <p:nvSpPr>
+          <p:cNvPr id="14" name="Rechteck: abgerundete Ecken 13">
+            <a:extLst>
+              <a:ext uri="{FF2B5EF4-FFF2-40B4-BE49-F238E27FC236}">
+                <a16:creationId xmlns:a16="http://schemas.microsoft.com/office/drawing/2014/main" id="{1EF20270-D2FC-1B75-D10E-7A14CA894F4E}"/>
+              </a:ext>
+            </a:extLst>
+          </p:cNvPr>
+          <p:cNvSpPr/>
+          <p:nvPr/>
+        </p:nvSpPr>
+        <p:spPr>
+          <a:xfrm>
+            <a:off x="1824405" y="6238663"/>
+            <a:ext cx="3610502" cy="332715"/>
+          </a:xfrm>
+          <a:prstGeom prst="roundRect">
+            <a:avLst/>
+          </a:prstGeom>
+          <a:ln>
+            <a:noFill/>
+          </a:ln>
+          <a:effectLst>
+            <a:outerShdw blurRad="50800" dist="38100" dir="2700000" algn="tl" rotWithShape="0">
+              <a:prstClr val="black">
+                <a:alpha val="40000"/>
+              </a:prstClr>
+            </a:outerShdw>
+          </a:effectLst>
+          <a:scene3d>
+            <a:camera prst="orthographicFront">
+              <a:rot lat="0" lon="0" rev="0"/>
+            </a:camera>
+            <a:lightRig rig="glow" dir="t">
+              <a:rot lat="0" lon="0" rev="4800000"/>
+            </a:lightRig>
+          </a:scene3d>
+          <a:sp3d prstMaterial="matte">
+            <a:bevelT w="127000" h="63500"/>
+          </a:sp3d>
+        </p:spPr>
+        <p:style>
+          <a:lnRef idx="0">
+            <a:schemeClr val="accent1"/>
+          </a:lnRef>
+          <a:fillRef idx="3">
+            <a:schemeClr val="accent1"/>
+          </a:fillRef>
+          <a:effectRef idx="3">
+            <a:schemeClr val="accent1"/>
+          </a:effectRef>
+          <a:fontRef idx="minor">
+            <a:schemeClr val="lt1"/>
+          </a:fontRef>
+        </p:style>
+        <p:txBody>
+          <a:bodyPr rtlCol="0" anchor="ctr"/>
+          <a:lstStyle/>
+          <a:p>
+            <a:pPr algn="ctr"/>
+            <a:r>
+              <a:rPr lang="en-US"/>
+              <a:t>Update Embedding </a:t>
+            </a:r>
+            <a:r>
+              <a:rPr lang="en-US" dirty="0"/>
+              <a:t>Status</a:t>
+            </a:r>
+          </a:p>
+        </p:txBody>
+      </p:sp>
+      <p:sp>
+        <p:nvSpPr>
+          <p:cNvPr id="16" name="Pfeil: nach unten 15">
+            <a:extLst>
+              <a:ext uri="{FF2B5EF4-FFF2-40B4-BE49-F238E27FC236}">
+                <a16:creationId xmlns:a16="http://schemas.microsoft.com/office/drawing/2014/main" id="{71C40B38-2C96-882A-5132-3F5EEB171B76}"/>
+              </a:ext>
+            </a:extLst>
+          </p:cNvPr>
+          <p:cNvSpPr/>
+          <p:nvPr/>
+        </p:nvSpPr>
+        <p:spPr>
+          <a:xfrm>
+            <a:off x="6865519" y="5881344"/>
+            <a:ext cx="92824" cy="179314"/>
+          </a:xfrm>
+          <a:prstGeom prst="downArrow">
+            <a:avLst/>
+          </a:prstGeom>
+          <a:solidFill>
+            <a:schemeClr val="bg2">
+              <a:lumMod val="50000"/>
+            </a:schemeClr>
+          </a:solidFill>
+        </p:spPr>
+        <p:style>
+          <a:lnRef idx="2">
+            <a:schemeClr val="dk1">
+              <a:shade val="50000"/>
+            </a:schemeClr>
+          </a:lnRef>
+          <a:fillRef idx="1">
+            <a:schemeClr val="dk1"/>
+          </a:fillRef>
+          <a:effectRef idx="0">
+            <a:schemeClr val="dk1"/>
+          </a:effectRef>
+          <a:fontRef idx="minor">
+            <a:schemeClr val="lt1"/>
+          </a:fontRef>
+        </p:style>
+        <p:txBody>
+          <a:bodyPr rtlCol="0" anchor="ctr"/>
+          <a:lstStyle/>
+          <a:p>
+            <a:pPr algn="ctr"/>
+            <a:endParaRPr lang="de-DE"/>
+          </a:p>
+        </p:txBody>
+      </p:sp>
+      <p:cxnSp>
+        <p:nvCxnSpPr>
+          <p:cNvPr id="17" name="Gerader Verbinder 16">
+            <a:extLst>
+              <a:ext uri="{FF2B5EF4-FFF2-40B4-BE49-F238E27FC236}">
+                <a16:creationId xmlns:a16="http://schemas.microsoft.com/office/drawing/2014/main" id="{43433B68-7B0C-B4E2-99E1-1CCAB669D5DB}"/>
+              </a:ext>
+            </a:extLst>
+          </p:cNvPr>
+          <p:cNvCxnSpPr>
+            <a:cxnSpLocks/>
+          </p:cNvCxnSpPr>
+          <p:nvPr/>
+        </p:nvCxnSpPr>
+        <p:spPr>
+          <a:xfrm>
+            <a:off x="6792411" y="5789136"/>
+            <a:ext cx="0" cy="332715"/>
+          </a:xfrm>
+          <a:prstGeom prst="line">
+            <a:avLst/>
+          </a:prstGeom>
+        </p:spPr>
+        <p:style>
+          <a:lnRef idx="1">
+            <a:schemeClr val="dk1"/>
+          </a:lnRef>
+          <a:fillRef idx="0">
+            <a:schemeClr val="dk1"/>
+          </a:fillRef>
+          <a:effectRef idx="0">
+            <a:schemeClr val="dk1"/>
+          </a:effectRef>
+          <a:fontRef idx="minor">
+            <a:schemeClr val="tx1"/>
+          </a:fontRef>
+        </p:style>
+      </p:cxnSp>
+    </p:spTree>
+    <p:extLst>
+      <p:ext uri="{BB962C8B-B14F-4D97-AF65-F5344CB8AC3E}">
+        <p14:creationId xmlns:p14="http://schemas.microsoft.com/office/powerpoint/2010/main" val="406222127"/>
+      </p:ext>
+    </p:extLst>
+  </p:cSld>
+  <p:clrMapOvr>
+    <a:masterClrMapping/>
+  </p:clrMapOvr>
+</p:sld>
+</file>
+
 <file path=ppt/theme/theme1.xml><?xml version="1.0" encoding="utf-8"?>
 <a:theme xmlns:a="http://schemas.openxmlformats.org/drawingml/2006/main" name="Office">
   <a:themeElements>

</xml_diff>

<commit_message>
Consolidate findings in v2.1.0_spec
</commit_message>
<xml_diff>
--- a/spec/pictures/Pages.pptx
+++ b/spec/pictures/Pages.pptx
@@ -116,7 +116,7 @@
 <file path=ppt/revisionInfo.xml><?xml version="1.0" encoding="utf-8"?>
 <p1510:revInfo xmlns:a="http://schemas.openxmlformats.org/drawingml/2006/main" xmlns:r="http://schemas.openxmlformats.org/officeDocument/2006/relationships" xmlns:p1510="http://schemas.microsoft.com/office/powerpoint/2015/10/main">
   <p1510:revLst>
-    <p1510:client id="{D54885B6-B0AF-458C-BA68-1BA13C3D521A}" v="3" dt="2024-01-26T17:32:50.328"/>
+    <p1510:client id="{D54885B6-B0AF-458C-BA68-1BA13C3D521A}" v="4" dt="2024-01-29T14:10:14.081"/>
   </p1510:revLst>
 </p1510:revInfo>
 </file>
@@ -126,12 +126,12 @@
   <pc:docChgLst>
     <pc:chgData name="Thorsten Heinze" userId="8373ecd2-b5b9-4b48-849d-3bee853f6cc0" providerId="ADAL" clId="{D54885B6-B0AF-458C-BA68-1BA13C3D521A}"/>
     <pc:docChg chg="addSld modSld">
-      <pc:chgData name="Thorsten Heinze" userId="8373ecd2-b5b9-4b48-849d-3bee853f6cc0" providerId="ADAL" clId="{D54885B6-B0AF-458C-BA68-1BA13C3D521A}" dt="2024-01-26T17:34:11.173" v="105" actId="1076"/>
+      <pc:chgData name="Thorsten Heinze" userId="8373ecd2-b5b9-4b48-849d-3bee853f6cc0" providerId="ADAL" clId="{D54885B6-B0AF-458C-BA68-1BA13C3D521A}" dt="2024-01-29T14:10:42.538" v="133" actId="20577"/>
       <pc:docMkLst>
         <pc:docMk/>
       </pc:docMkLst>
       <pc:sldChg chg="addSp modSp add mod">
-        <pc:chgData name="Thorsten Heinze" userId="8373ecd2-b5b9-4b48-849d-3bee853f6cc0" providerId="ADAL" clId="{D54885B6-B0AF-458C-BA68-1BA13C3D521A}" dt="2024-01-26T17:34:11.173" v="105" actId="1076"/>
+        <pc:chgData name="Thorsten Heinze" userId="8373ecd2-b5b9-4b48-849d-3bee853f6cc0" providerId="ADAL" clId="{D54885B6-B0AF-458C-BA68-1BA13C3D521A}" dt="2024-01-29T14:10:42.538" v="133" actId="20577"/>
         <pc:sldMkLst>
           <pc:docMk/>
           <pc:sldMk cId="406222127" sldId="264"/>
@@ -161,7 +161,7 @@
           </ac:spMkLst>
         </pc:spChg>
         <pc:spChg chg="add mod">
-          <ac:chgData name="Thorsten Heinze" userId="8373ecd2-b5b9-4b48-849d-3bee853f6cc0" providerId="ADAL" clId="{D54885B6-B0AF-458C-BA68-1BA13C3D521A}" dt="2024-01-26T17:34:11.173" v="105" actId="1076"/>
+          <ac:chgData name="Thorsten Heinze" userId="8373ecd2-b5b9-4b48-849d-3bee853f6cc0" providerId="ADAL" clId="{D54885B6-B0AF-458C-BA68-1BA13C3D521A}" dt="2024-01-29T14:10:42.538" v="133" actId="20577"/>
           <ac:spMkLst>
             <pc:docMk/>
             <pc:sldMk cId="406222127" sldId="264"/>
@@ -238,6 +238,14 @@
             <pc:docMk/>
             <pc:sldMk cId="406222127" sldId="264"/>
             <ac:spMk id="16" creationId="{71C40B38-2C96-882A-5132-3F5EEB171B76}"/>
+          </ac:spMkLst>
+        </pc:spChg>
+        <pc:spChg chg="add mod">
+          <ac:chgData name="Thorsten Heinze" userId="8373ecd2-b5b9-4b48-849d-3bee853f6cc0" providerId="ADAL" clId="{D54885B6-B0AF-458C-BA68-1BA13C3D521A}" dt="2024-01-29T14:10:18.625" v="107" actId="14100"/>
+          <ac:spMkLst>
+            <pc:docMk/>
+            <pc:sldMk cId="406222127" sldId="264"/>
+            <ac:spMk id="22" creationId="{152CE6E7-A24E-04A2-7FDF-7F6BB38728A6}"/>
           </ac:spMkLst>
         </pc:spChg>
         <pc:spChg chg="mod">
@@ -1149,7 +1157,7 @@
           <a:p>
             <a:fld id="{48B9BBD4-0F2B-4EE5-BDD5-C9DF58FE3246}" type="datetimeFigureOut">
               <a:rPr lang="de-DE" smtClean="0"/>
-              <a:t>26.01.2024</a:t>
+              <a:t>29.01.2024</a:t>
             </a:fld>
             <a:endParaRPr lang="de-DE"/>
           </a:p>
@@ -1347,7 +1355,7 @@
           <a:p>
             <a:fld id="{48B9BBD4-0F2B-4EE5-BDD5-C9DF58FE3246}" type="datetimeFigureOut">
               <a:rPr lang="de-DE" smtClean="0"/>
-              <a:t>26.01.2024</a:t>
+              <a:t>29.01.2024</a:t>
             </a:fld>
             <a:endParaRPr lang="de-DE"/>
           </a:p>
@@ -1555,7 +1563,7 @@
           <a:p>
             <a:fld id="{48B9BBD4-0F2B-4EE5-BDD5-C9DF58FE3246}" type="datetimeFigureOut">
               <a:rPr lang="de-DE" smtClean="0"/>
-              <a:t>26.01.2024</a:t>
+              <a:t>29.01.2024</a:t>
             </a:fld>
             <a:endParaRPr lang="de-DE"/>
           </a:p>
@@ -1753,7 +1761,7 @@
           <a:p>
             <a:fld id="{48B9BBD4-0F2B-4EE5-BDD5-C9DF58FE3246}" type="datetimeFigureOut">
               <a:rPr lang="de-DE" smtClean="0"/>
-              <a:t>26.01.2024</a:t>
+              <a:t>29.01.2024</a:t>
             </a:fld>
             <a:endParaRPr lang="de-DE"/>
           </a:p>
@@ -2028,7 +2036,7 @@
           <a:p>
             <a:fld id="{48B9BBD4-0F2B-4EE5-BDD5-C9DF58FE3246}" type="datetimeFigureOut">
               <a:rPr lang="de-DE" smtClean="0"/>
-              <a:t>26.01.2024</a:t>
+              <a:t>29.01.2024</a:t>
             </a:fld>
             <a:endParaRPr lang="de-DE"/>
           </a:p>
@@ -2293,7 +2301,7 @@
           <a:p>
             <a:fld id="{48B9BBD4-0F2B-4EE5-BDD5-C9DF58FE3246}" type="datetimeFigureOut">
               <a:rPr lang="de-DE" smtClean="0"/>
-              <a:t>26.01.2024</a:t>
+              <a:t>29.01.2024</a:t>
             </a:fld>
             <a:endParaRPr lang="de-DE"/>
           </a:p>
@@ -2705,7 +2713,7 @@
           <a:p>
             <a:fld id="{48B9BBD4-0F2B-4EE5-BDD5-C9DF58FE3246}" type="datetimeFigureOut">
               <a:rPr lang="de-DE" smtClean="0"/>
-              <a:t>26.01.2024</a:t>
+              <a:t>29.01.2024</a:t>
             </a:fld>
             <a:endParaRPr lang="de-DE"/>
           </a:p>
@@ -2846,7 +2854,7 @@
           <a:p>
             <a:fld id="{48B9BBD4-0F2B-4EE5-BDD5-C9DF58FE3246}" type="datetimeFigureOut">
               <a:rPr lang="de-DE" smtClean="0"/>
-              <a:t>26.01.2024</a:t>
+              <a:t>29.01.2024</a:t>
             </a:fld>
             <a:endParaRPr lang="de-DE"/>
           </a:p>
@@ -2959,7 +2967,7 @@
           <a:p>
             <a:fld id="{48B9BBD4-0F2B-4EE5-BDD5-C9DF58FE3246}" type="datetimeFigureOut">
               <a:rPr lang="de-DE" smtClean="0"/>
-              <a:t>26.01.2024</a:t>
+              <a:t>29.01.2024</a:t>
             </a:fld>
             <a:endParaRPr lang="de-DE"/>
           </a:p>
@@ -3270,7 +3278,7 @@
           <a:p>
             <a:fld id="{48B9BBD4-0F2B-4EE5-BDD5-C9DF58FE3246}" type="datetimeFigureOut">
               <a:rPr lang="de-DE" smtClean="0"/>
-              <a:t>26.01.2024</a:t>
+              <a:t>29.01.2024</a:t>
             </a:fld>
             <a:endParaRPr lang="de-DE"/>
           </a:p>
@@ -3558,7 +3566,7 @@
           <a:p>
             <a:fld id="{48B9BBD4-0F2B-4EE5-BDD5-C9DF58FE3246}" type="datetimeFigureOut">
               <a:rPr lang="de-DE" smtClean="0"/>
-              <a:t>26.01.2024</a:t>
+              <a:t>29.01.2024</a:t>
             </a:fld>
             <a:endParaRPr lang="de-DE"/>
           </a:p>
@@ -3799,7 +3807,7 @@
           <a:p>
             <a:fld id="{48B9BBD4-0F2B-4EE5-BDD5-C9DF58FE3246}" type="datetimeFigureOut">
               <a:rPr lang="de-DE" smtClean="0"/>
-              <a:t>26.01.2024</a:t>
+              <a:t>29.01.2024</a:t>
             </a:fld>
             <a:endParaRPr lang="de-DE"/>
           </a:p>
@@ -6386,7 +6394,7 @@
         <p:spPr>
           <a:xfrm>
             <a:off x="1766665" y="5481597"/>
-            <a:ext cx="5207045" cy="338554"/>
+            <a:ext cx="7881358" cy="338554"/>
           </a:xfrm>
           <a:prstGeom prst="rect">
             <a:avLst/>
@@ -6520,7 +6528,7 @@
                   <a:schemeClr val="tx1"/>
                 </a:solidFill>
               </a:rPr>
-              <a:t>EmbeddingStatus </a:t>
+              <a:t>EmbeddingStatus</a:t>
             </a:r>
             <a:r>
               <a:rPr lang="de-DE">
@@ -6528,7 +6536,7 @@
                   <a:schemeClr val="tx1"/>
                 </a:solidFill>
               </a:rPr>
-              <a:t>:</a:t>
+              <a:t>:      ReasonOfFailure:</a:t>
             </a:r>
             <a:endParaRPr lang="de-DE" dirty="0">
               <a:solidFill>
@@ -6831,6 +6839,50 @@
           </a:fontRef>
         </p:style>
       </p:cxnSp>
+      <p:sp>
+        <p:nvSpPr>
+          <p:cNvPr id="22" name="Rechteck 21">
+            <a:extLst>
+              <a:ext uri="{FF2B5EF4-FFF2-40B4-BE49-F238E27FC236}">
+                <a16:creationId xmlns:a16="http://schemas.microsoft.com/office/drawing/2014/main" id="{152CE6E7-A24E-04A2-7FDF-7F6BB38728A6}"/>
+              </a:ext>
+            </a:extLst>
+          </p:cNvPr>
+          <p:cNvSpPr/>
+          <p:nvPr/>
+        </p:nvSpPr>
+        <p:spPr>
+          <a:xfrm>
+            <a:off x="7142110" y="5789135"/>
+            <a:ext cx="2488082" cy="332715"/>
+          </a:xfrm>
+          <a:prstGeom prst="rect">
+            <a:avLst/>
+          </a:prstGeom>
+        </p:spPr>
+        <p:style>
+          <a:lnRef idx="2">
+            <a:schemeClr val="accent1"/>
+          </a:lnRef>
+          <a:fillRef idx="1">
+            <a:schemeClr val="lt1"/>
+          </a:fillRef>
+          <a:effectRef idx="0">
+            <a:schemeClr val="accent1"/>
+          </a:effectRef>
+          <a:fontRef idx="minor">
+            <a:schemeClr val="dk1"/>
+          </a:fontRef>
+        </p:style>
+        <p:txBody>
+          <a:bodyPr rtlCol="0" anchor="ctr"/>
+          <a:lstStyle/>
+          <a:p>
+            <a:pPr algn="ctr"/>
+            <a:endParaRPr lang="en-US"/>
+          </a:p>
+        </p:txBody>
+      </p:sp>
     </p:spTree>
     <p:extLst>
       <p:ext uri="{BB962C8B-B14F-4D97-AF65-F5344CB8AC3E}">

</xml_diff>